<commit_message>
Near final draft. Working HTML and notebook. Cleaned old files.
</commit_message>
<xml_diff>
--- a/Doc/databases-and-R_Presentation.pptx
+++ b/Doc/databases-and-R_Presentation.pptx
@@ -13,6 +13,15 @@
     <p:sldId id="261" r:id="rId7"/>
     <p:sldId id="262" r:id="rId8"/>
     <p:sldId id="263" r:id="rId9"/>
+    <p:sldId id="264" r:id="rId10"/>
+    <p:sldId id="265" r:id="rId11"/>
+    <p:sldId id="266" r:id="rId12"/>
+    <p:sldId id="267" r:id="rId13"/>
+    <p:sldId id="268" r:id="rId14"/>
+    <p:sldId id="269" r:id="rId15"/>
+    <p:sldId id="270" r:id="rId16"/>
+    <p:sldId id="271" r:id="rId17"/>
+    <p:sldId id="272" r:id="rId18"/>
   </p:sldIdLst>
   <p:sldSz cx="9144000" cy="6858000" type="screen4x3"/>
   <p:notesSz cx="6858000" cy="9144000"/>
@@ -3250,7 +3259,7 @@
 </p:sld>
 </file>
 
-<file path=ppt/slides/slide2.xml><?xml version="1.0" encoding="utf-8"?>
+<file path=ppt/slides/slide10.xml><?xml version="1.0" encoding="utf-8"?>
 <p:sld xmlns:a="http://schemas.openxmlformats.org/drawingml/2006/main" xmlns:r="http://schemas.openxmlformats.org/officeDocument/2006/relationships" xmlns:p="http://schemas.openxmlformats.org/presentationml/2006/main">
   <p:cSld>
     <p:spTree>
@@ -3287,7 +3296,7 @@
             </a:pPr>
             <a:r>
               <a:rPr/>
-              <a:t>What</a:t>
+              <a:t>Data</a:t>
             </a:r>
             <a:r>
               <a:rPr/>
@@ -3295,7 +3304,7 @@
             </a:r>
             <a:r>
               <a:rPr/>
-              <a:t>is</a:t>
+              <a:t>Source</a:t>
             </a:r>
             <a:r>
               <a:rPr/>
@@ -3303,7 +3312,7 @@
             </a:r>
             <a:r>
               <a:rPr/>
-              <a:t>a</a:t>
+              <a:t>Name</a:t>
             </a:r>
             <a:r>
               <a:rPr/>
@@ -3311,7 +3320,15 @@
             </a:r>
             <a:r>
               <a:rPr/>
-              <a:t>database</a:t>
+              <a:t>(</a:t>
+            </a:r>
+            <a:r>
+              <a:rPr b="1"/>
+              <a:t>DSN</a:t>
+            </a:r>
+            <a:r>
+              <a:rPr/>
+              <a:t>)</a:t>
             </a:r>
           </a:p>
         </p:txBody>
@@ -3336,34 +3353,276 @@
             </a:pPr>
             <a:r>
               <a:rPr/>
-              <a:t>This is an R Markdown presentation. Markdown is a simple formatting syntax for authoring HTML, PDF, and MS Word documents. For more details on using R Markdown see </a:t>
-            </a:r>
-            <a:r>
-              <a:rPr>
-                <a:hlinkClick r:id="rId2"/>
-              </a:rPr>
-              <a:t>http://rmarkdown.rstudio.com</a:t>
-            </a:r>
-            <a:r>
-              <a:rPr/>
-              <a:t>.</a:t>
-            </a:r>
-          </a:p>
-          <a:p>
-            <a:pPr lvl="0" marL="0" indent="0">
+              <a:t>Configure a DSN in code.</a:t>
+            </a:r>
+          </a:p>
+          <a:p>
+            <a:pPr lvl="0" marL="1270000" indent="0">
               <a:buNone/>
             </a:pPr>
             <a:r>
-              <a:rPr/>
-              <a:t>When you click the </a:t>
-            </a:r>
-            <a:r>
-              <a:rPr b="1"/>
-              <a:t>Knit</a:t>
-            </a:r>
-            <a:r>
-              <a:rPr/>
-              <a:t> button a document will be generated that includes both content as well as the output of any embedded R code chunks within the document.</a:t>
+              <a:rPr sz="1800" i="1">
+                <a:solidFill>
+                  <a:srgbClr val="60A0B0"/>
+                </a:solidFill>
+                <a:latin typeface="Courier"/>
+              </a:rPr>
+              <a:t># Configure the connection</a:t>
+            </a:r>
+            <a:br/>
+            <a:r>
+              <a:rPr sz="1800">
+                <a:latin typeface="Courier"/>
+              </a:rPr>
+              <a:t>con &lt;-</a:t>
+            </a:r>
+            <a:r>
+              <a:rPr sz="1800">
+                <a:solidFill>
+                  <a:srgbClr val="4070A0"/>
+                </a:solidFill>
+                <a:latin typeface="Courier"/>
+              </a:rPr>
+              <a:t> </a:t>
+            </a:r>
+            <a:r>
+              <a:rPr sz="1800" b="1">
+                <a:solidFill>
+                  <a:srgbClr val="007020"/>
+                </a:solidFill>
+                <a:latin typeface="Courier"/>
+              </a:rPr>
+              <a:t>dbConnect</a:t>
+            </a:r>
+            <a:r>
+              <a:rPr sz="1800">
+                <a:latin typeface="Courier"/>
+              </a:rPr>
+              <a:t>(</a:t>
+            </a:r>
+            <a:r>
+              <a:rPr sz="1800" b="1">
+                <a:solidFill>
+                  <a:srgbClr val="007020"/>
+                </a:solidFill>
+                <a:latin typeface="Courier"/>
+              </a:rPr>
+              <a:t>odbc</a:t>
+            </a:r>
+            <a:r>
+              <a:rPr sz="1800">
+                <a:latin typeface="Courier"/>
+              </a:rPr>
+              <a:t>(), </a:t>
+            </a:r>
+            <a:br/>
+            <a:r>
+              <a:rPr sz="1800">
+                <a:latin typeface="Courier"/>
+              </a:rPr>
+              <a:t>                 </a:t>
+            </a:r>
+            <a:r>
+              <a:rPr sz="1800">
+                <a:solidFill>
+                  <a:srgbClr val="902000"/>
+                </a:solidFill>
+                <a:latin typeface="Courier"/>
+              </a:rPr>
+              <a:t>Driver =</a:t>
+            </a:r>
+            <a:r>
+              <a:rPr sz="1800">
+                <a:latin typeface="Courier"/>
+              </a:rPr>
+              <a:t> </a:t>
+            </a:r>
+            <a:r>
+              <a:rPr sz="1800">
+                <a:solidFill>
+                  <a:srgbClr val="4070A0"/>
+                </a:solidFill>
+                <a:latin typeface="Courier"/>
+              </a:rPr>
+              <a:t>"SQL Server"</a:t>
+            </a:r>
+            <a:r>
+              <a:rPr sz="1800">
+                <a:latin typeface="Courier"/>
+              </a:rPr>
+              <a:t>, </a:t>
+            </a:r>
+            <a:br/>
+            <a:r>
+              <a:rPr sz="1800">
+                <a:latin typeface="Courier"/>
+              </a:rPr>
+              <a:t>                 </a:t>
+            </a:r>
+            <a:r>
+              <a:rPr sz="1800">
+                <a:solidFill>
+                  <a:srgbClr val="902000"/>
+                </a:solidFill>
+                <a:latin typeface="Courier"/>
+              </a:rPr>
+              <a:t>Server =</a:t>
+            </a:r>
+            <a:r>
+              <a:rPr sz="1800">
+                <a:latin typeface="Courier"/>
+              </a:rPr>
+              <a:t> </a:t>
+            </a:r>
+            <a:r>
+              <a:rPr sz="1800">
+                <a:solidFill>
+                  <a:srgbClr val="4070A0"/>
+                </a:solidFill>
+                <a:latin typeface="Courier"/>
+              </a:rPr>
+              <a:t>"161.55.235.187"</a:t>
+            </a:r>
+            <a:r>
+              <a:rPr sz="1800">
+                <a:latin typeface="Courier"/>
+              </a:rPr>
+              <a:t>, </a:t>
+            </a:r>
+            <a:br/>
+            <a:r>
+              <a:rPr sz="1800">
+                <a:latin typeface="Courier"/>
+              </a:rPr>
+              <a:t>                 </a:t>
+            </a:r>
+            <a:r>
+              <a:rPr sz="1800">
+                <a:solidFill>
+                  <a:srgbClr val="902000"/>
+                </a:solidFill>
+                <a:latin typeface="Courier"/>
+              </a:rPr>
+              <a:t>Database =</a:t>
+            </a:r>
+            <a:r>
+              <a:rPr sz="1800">
+                <a:latin typeface="Courier"/>
+              </a:rPr>
+              <a:t> </a:t>
+            </a:r>
+            <a:r>
+              <a:rPr sz="1800">
+                <a:solidFill>
+                  <a:srgbClr val="4070A0"/>
+                </a:solidFill>
+                <a:latin typeface="Courier"/>
+              </a:rPr>
+              <a:t>"ROV2"</a:t>
+            </a:r>
+            <a:r>
+              <a:rPr sz="1800">
+                <a:latin typeface="Courier"/>
+              </a:rPr>
+              <a:t>, </a:t>
+            </a:r>
+            <a:br/>
+            <a:r>
+              <a:rPr sz="1800">
+                <a:latin typeface="Courier"/>
+              </a:rPr>
+              <a:t>                 </a:t>
+            </a:r>
+            <a:r>
+              <a:rPr sz="1800">
+                <a:solidFill>
+                  <a:srgbClr val="902000"/>
+                </a:solidFill>
+                <a:latin typeface="Courier"/>
+              </a:rPr>
+              <a:t>Trusted_Connection =</a:t>
+            </a:r>
+            <a:r>
+              <a:rPr sz="1800">
+                <a:latin typeface="Courier"/>
+              </a:rPr>
+              <a:t> </a:t>
+            </a:r>
+            <a:r>
+              <a:rPr sz="1800">
+                <a:solidFill>
+                  <a:srgbClr val="4070A0"/>
+                </a:solidFill>
+                <a:latin typeface="Courier"/>
+              </a:rPr>
+              <a:t>"True"</a:t>
+            </a:r>
+            <a:r>
+              <a:rPr sz="1800">
+                <a:latin typeface="Courier"/>
+              </a:rPr>
+              <a:t>)</a:t>
+            </a:r>
+            <a:br/>
+            <a:br/>
+            <a:r>
+              <a:rPr sz="1800" i="1">
+                <a:solidFill>
+                  <a:srgbClr val="60A0B0"/>
+                </a:solidFill>
+                <a:latin typeface="Courier"/>
+              </a:rPr>
+              <a:t># Show connection details</a:t>
+            </a:r>
+            <a:br/>
+            <a:r>
+              <a:rPr sz="1800">
+                <a:latin typeface="Courier"/>
+              </a:rPr>
+              <a:t>con</a:t>
+            </a:r>
+          </a:p>
+          <a:p>
+            <a:pPr lvl="0" marL="1270000" indent="0">
+              <a:buNone/>
+            </a:pPr>
+            <a:r>
+              <a:rPr sz="1800">
+                <a:latin typeface="Courier"/>
+              </a:rPr>
+              <a:t>## &lt;OdbcConnection&gt; dbo@SWC-ESTRELLA-S
+##   Database: ROV2
+##   Microsoft SQL Server Version: 12.00.5214</a:t>
+            </a:r>
+          </a:p>
+          <a:p>
+            <a:pPr lvl="0" marL="1270000" indent="0">
+              <a:buNone/>
+            </a:pPr>
+            <a:r>
+              <a:rPr sz="1800" i="1">
+                <a:solidFill>
+                  <a:srgbClr val="60A0B0"/>
+                </a:solidFill>
+                <a:latin typeface="Courier"/>
+              </a:rPr>
+              <a:t># Disconnect from database</a:t>
+            </a:r>
+            <a:br/>
+            <a:r>
+              <a:rPr sz="1800" b="1">
+                <a:solidFill>
+                  <a:srgbClr val="007020"/>
+                </a:solidFill>
+                <a:latin typeface="Courier"/>
+              </a:rPr>
+              <a:t>dbDisconnect</a:t>
+            </a:r>
+            <a:r>
+              <a:rPr sz="1800">
+                <a:latin typeface="Courier"/>
+              </a:rPr>
+              <a:t>(con)</a:t>
             </a:r>
           </a:p>
         </p:txBody>
@@ -3373,7 +3632,7 @@
 </p:sld>
 </file>
 
-<file path=ppt/slides/slide3.xml><?xml version="1.0" encoding="utf-8"?>
+<file path=ppt/slides/slide11.xml><?xml version="1.0" encoding="utf-8"?>
 <p:sld xmlns:a="http://schemas.openxmlformats.org/drawingml/2006/main" xmlns:r="http://schemas.openxmlformats.org/officeDocument/2006/relationships" xmlns:p="http://schemas.openxmlformats.org/presentationml/2006/main">
   <p:cSld>
     <p:spTree>
@@ -3410,7 +3669,7 @@
             </a:pPr>
             <a:r>
               <a:rPr/>
-              <a:t>Why</a:t>
+              <a:t>Accessing</a:t>
             </a:r>
             <a:r>
               <a:rPr/>
@@ -3418,7 +3677,7 @@
             </a:r>
             <a:r>
               <a:rPr/>
-              <a:t>put</a:t>
+              <a:t>databases</a:t>
             </a:r>
             <a:r>
               <a:rPr/>
@@ -3426,7 +3685,7 @@
             </a:r>
             <a:r>
               <a:rPr/>
-              <a:t>data</a:t>
+              <a:t>using</a:t>
             </a:r>
             <a:r>
               <a:rPr/>
@@ -3434,77 +3693,47 @@
             </a:r>
             <a:r>
               <a:rPr/>
-              <a:t>in</a:t>
-            </a:r>
-            <a:r>
-              <a:rPr/>
-              <a:t> </a:t>
-            </a:r>
-            <a:r>
-              <a:rPr/>
-              <a:t>a</a:t>
-            </a:r>
-            <a:r>
-              <a:rPr/>
-              <a:t> </a:t>
-            </a:r>
-            <a:r>
-              <a:rPr/>
-              <a:t>database?</a:t>
-            </a:r>
-          </a:p>
-        </p:txBody>
-      </p:sp>
-      <p:sp>
-        <p:nvSpPr>
-          <p:cNvPr id="3" name="Content Placeholder 2"/>
-          <p:cNvSpPr>
-            <a:spLocks noGrp="1"/>
-          </p:cNvSpPr>
-          <p:nvPr>
-            <p:ph idx="1"/>
-          </p:nvPr>
-        </p:nvSpPr>
-        <p:spPr/>
-        <p:txBody>
-          <a:bodyPr/>
-          <a:lstStyle/>
-          <a:p>
-            <a:pPr lvl="1"/>
-            <a:r>
-              <a:rPr/>
-              <a:t>Getting away from working with static flat files with multiple copies/versions</a:t>
-            </a:r>
-          </a:p>
-          <a:p>
-            <a:pPr lvl="1"/>
-            <a:r>
-              <a:rPr/>
-              <a:t>Centralize data storage to use by many at once</a:t>
-            </a:r>
-          </a:p>
-          <a:p>
-            <a:pPr lvl="1"/>
-            <a:r>
-              <a:rPr/>
-              <a:t>Enforce data integrity</a:t>
-            </a:r>
-          </a:p>
-          <a:p>
-            <a:pPr lvl="1"/>
-            <a:r>
-              <a:rPr/>
-              <a:t>Working efficiently with large amounts of data</a:t>
-            </a:r>
-          </a:p>
-        </p:txBody>
-      </p:sp>
+              <a:t>R</a:t>
+            </a:r>
+          </a:p>
+        </p:txBody>
+      </p:sp>
+      <p:pic>
+        <p:nvPicPr>
+          <p:cNvPr descr="../images/commercial.png" id="0" name="Picture 1"/>
+          <p:cNvPicPr>
+            <a:picLocks noGrp="1" noChangeAspect="1"/>
+          </p:cNvPicPr>
+          <p:nvPr/>
+        </p:nvPicPr>
+        <p:blipFill>
+          <a:blip r:embed="rId2"/>
+          <a:stretch>
+            <a:fillRect/>
+          </a:stretch>
+        </p:blipFill>
+        <p:spPr bwMode="auto">
+          <a:xfrm>
+            <a:off x="457200" y="1828800"/>
+            <a:ext cx="8229600" cy="4076700"/>
+          </a:xfrm>
+          <a:prstGeom prst="rect">
+            <a:avLst/>
+          </a:prstGeom>
+          <a:noFill/>
+          <a:ln w="9525">
+            <a:noFill/>
+            <a:headEnd/>
+            <a:tailEnd/>
+          </a:ln>
+        </p:spPr>
+      </p:pic>
     </p:spTree>
   </p:cSld>
 </p:sld>
 </file>
 
-<file path=ppt/slides/slide4.xml><?xml version="1.0" encoding="utf-8"?>
+<file path=ppt/slides/slide12.xml><?xml version="1.0" encoding="utf-8"?>
 <p:sld xmlns:a="http://schemas.openxmlformats.org/drawingml/2006/main" xmlns:r="http://schemas.openxmlformats.org/officeDocument/2006/relationships" xmlns:p="http://schemas.openxmlformats.org/presentationml/2006/main">
   <p:cSld>
     <p:spTree>
@@ -3541,7 +3770,7 @@
             </a:pPr>
             <a:r>
               <a:rPr/>
-              <a:t>How</a:t>
+              <a:t>Motivation</a:t>
             </a:r>
             <a:r>
               <a:rPr/>
@@ -3549,7 +3778,7 @@
             </a:r>
             <a:r>
               <a:rPr/>
-              <a:t>do</a:t>
+              <a:t>for</a:t>
             </a:r>
             <a:r>
               <a:rPr/>
@@ -3557,7 +3786,7 @@
             </a:r>
             <a:r>
               <a:rPr/>
-              <a:t>we</a:t>
+              <a:t>this</a:t>
             </a:r>
             <a:r>
               <a:rPr/>
@@ -3565,31 +3794,61 @@
             </a:r>
             <a:r>
               <a:rPr/>
-              <a:t>get</a:t>
-            </a:r>
-            <a:r>
-              <a:rPr/>
-              <a:t> </a:t>
-            </a:r>
-            <a:r>
-              <a:rPr/>
-              <a:t>data</a:t>
-            </a:r>
-            <a:r>
-              <a:rPr/>
-              <a:t> </a:t>
-            </a:r>
-            <a:r>
-              <a:rPr/>
-              <a:t>from</a:t>
-            </a:r>
-            <a:r>
-              <a:rPr/>
-              <a:t> </a:t>
-            </a:r>
-            <a:r>
-              <a:rPr/>
-              <a:t>databases?</a:t>
+              <a:t>presentation?</a:t>
+            </a:r>
+          </a:p>
+        </p:txBody>
+      </p:sp>
+      <p:sp>
+        <p:nvSpPr>
+          <p:cNvPr id="3" name="Content Placeholder 2"/>
+          <p:cNvSpPr>
+            <a:spLocks noGrp="1"/>
+          </p:cNvSpPr>
+          <p:nvPr>
+            <p:ph idx="1"/>
+          </p:nvPr>
+        </p:nvSpPr>
+        <p:spPr/>
+        <p:txBody>
+          <a:bodyPr/>
+          <a:lstStyle/>
+          <a:p>
+            <a:pPr lvl="0" marL="0" indent="0">
+              <a:buNone/>
+            </a:pPr>
+            <a:r>
+              <a:rPr/>
+              <a:t>The materials in this presentation have been largely adapted from the Rstudio Webinar by Edgar Ruiz entitled: </a:t>
+            </a:r>
+            <a:r>
+              <a:rPr>
+                <a:hlinkClick r:id="rId2"/>
+              </a:rPr>
+              <a:t>Best practices for working with databases</a:t>
+            </a:r>
+            <a:r>
+              <a:rPr/>
+              <a:t>.</a:t>
+            </a:r>
+          </a:p>
+          <a:p>
+            <a:pPr lvl="0" marL="0" indent="0">
+              <a:buNone/>
+            </a:pPr>
+            <a:r>
+              <a:rPr/>
+              <a:t>A great resource for tools and best practices when working with databases in R can be found here: </a:t>
+            </a:r>
+            <a:r>
+              <a:rPr>
+                <a:hlinkClick r:id="rId3"/>
+              </a:rPr>
+              <a:t>db.rstudio.com</a:t>
+            </a:r>
+            <a:r>
+              <a:rPr/>
+              <a:t>.</a:t>
             </a:r>
           </a:p>
         </p:txBody>
@@ -3599,7 +3858,7 @@
 </p:sld>
 </file>
 
-<file path=ppt/slides/slide5.xml><?xml version="1.0" encoding="utf-8"?>
+<file path=ppt/slides/slide13.xml><?xml version="1.0" encoding="utf-8"?>
 <p:sld xmlns:a="http://schemas.openxmlformats.org/drawingml/2006/main" xmlns:r="http://schemas.openxmlformats.org/officeDocument/2006/relationships" xmlns:p="http://schemas.openxmlformats.org/presentationml/2006/main">
   <p:cSld>
     <p:spTree>
@@ -3636,7 +3895,7 @@
             </a:pPr>
             <a:r>
               <a:rPr/>
-              <a:t>How</a:t>
+              <a:t>Inspiration</a:t>
             </a:r>
             <a:r>
               <a:rPr/>
@@ -3644,7 +3903,7 @@
             </a:r>
             <a:r>
               <a:rPr/>
-              <a:t>can</a:t>
+              <a:t>for</a:t>
             </a:r>
             <a:r>
               <a:rPr/>
@@ -3652,7 +3911,7 @@
             </a:r>
             <a:r>
               <a:rPr/>
-              <a:t>we</a:t>
+              <a:t>this</a:t>
             </a:r>
             <a:r>
               <a:rPr/>
@@ -3660,55 +3919,98 @@
             </a:r>
             <a:r>
               <a:rPr/>
-              <a:t>get</a:t>
-            </a:r>
-            <a:r>
-              <a:rPr/>
-              <a:t> </a:t>
-            </a:r>
-            <a:r>
-              <a:rPr/>
-              <a:t>data</a:t>
-            </a:r>
-            <a:r>
-              <a:rPr/>
-              <a:t> </a:t>
-            </a:r>
-            <a:r>
-              <a:rPr/>
-              <a:t>from</a:t>
-            </a:r>
-            <a:r>
-              <a:rPr/>
-              <a:t> </a:t>
-            </a:r>
-            <a:r>
-              <a:rPr/>
-              <a:t>a</a:t>
-            </a:r>
-            <a:r>
-              <a:rPr/>
-              <a:t> </a:t>
-            </a:r>
-            <a:r>
-              <a:rPr/>
-              <a:t>database</a:t>
-            </a:r>
-            <a:r>
-              <a:rPr/>
-              <a:t> </a:t>
-            </a:r>
-            <a:r>
-              <a:rPr/>
-              <a:t>using</a:t>
-            </a:r>
-            <a:r>
-              <a:rPr/>
-              <a:t> </a:t>
-            </a:r>
-            <a:r>
-              <a:rPr/>
-              <a:t>R?</a:t>
+              <a:t>talk</a:t>
+            </a:r>
+          </a:p>
+        </p:txBody>
+      </p:sp>
+      <p:sp>
+        <p:nvSpPr>
+          <p:cNvPr id="3" name="Content Placeholder 2"/>
+          <p:cNvSpPr>
+            <a:spLocks noGrp="1"/>
+          </p:cNvSpPr>
+          <p:nvPr>
+            <p:ph idx="1"/>
+          </p:nvPr>
+        </p:nvSpPr>
+        <p:spPr/>
+        <p:txBody>
+          <a:bodyPr/>
+          <a:lstStyle/>
+          <a:p>
+            <a:pPr lvl="1"/>
+            <a:r>
+              <a:rPr/>
+              <a:t>Stay within your R workflow</a:t>
+            </a:r>
+          </a:p>
+          <a:p>
+            <a:pPr lvl="1"/>
+            <a:r>
+              <a:rPr/>
+              <a:t>Use database engines (e.g., SQL Engine) to speed workflow by analyzing data in place</a:t>
+            </a:r>
+          </a:p>
+          <a:p>
+            <a:pPr lvl="1"/>
+            <a:r>
+              <a:rPr/>
+              <a:t>Taking advantage of more intuitive </a:t>
+            </a:r>
+            <a:r>
+              <a:rPr>
+                <a:hlinkClick r:id="rId2"/>
+              </a:rPr>
+              <a:t>tidyverse</a:t>
+            </a:r>
+            <a:r>
+              <a:rPr/>
+              <a:t> tools (e.g., </a:t>
+            </a:r>
+            <a:r>
+              <a:rPr sz="1800">
+                <a:latin typeface="Courier"/>
+              </a:rPr>
+              <a:t>dplyr</a:t>
+            </a:r>
+            <a:r>
+              <a:rPr/>
+              <a:t>) and the pipe operator (</a:t>
+            </a:r>
+            <a:r>
+              <a:rPr sz="1800">
+                <a:latin typeface="Courier"/>
+              </a:rPr>
+              <a:t>%&gt;%</a:t>
+            </a:r>
+            <a:r>
+              <a:rPr/>
+              <a:t>)</a:t>
+            </a:r>
+          </a:p>
+          <a:p>
+            <a:pPr lvl="1"/>
+            <a:r>
+              <a:rPr/>
+              <a:t>Never have to learn SQL, thanks to </a:t>
+            </a:r>
+            <a:r>
+              <a:rPr sz="1800">
+                <a:latin typeface="Courier"/>
+              </a:rPr>
+              <a:t>dbplyr</a:t>
+            </a:r>
+            <a:r>
+              <a:rPr/>
+              <a:t> 😉</a:t>
+            </a:r>
+          </a:p>
+          <a:p>
+            <a:pPr lvl="1"/>
+            <a:r>
+              <a:rPr/>
+              <a:t>Encourage reproducible research by linking data to analysis</a:t>
             </a:r>
           </a:p>
         </p:txBody>
@@ -3718,7 +4020,7 @@
 </p:sld>
 </file>
 
-<file path=ppt/slides/slide6.xml><?xml version="1.0" encoding="utf-8"?>
+<file path=ppt/slides/slide14.xml><?xml version="1.0" encoding="utf-8"?>
 <p:sld xmlns:a="http://schemas.openxmlformats.org/drawingml/2006/main" xmlns:r="http://schemas.openxmlformats.org/officeDocument/2006/relationships" xmlns:p="http://schemas.openxmlformats.org/presentationml/2006/main">
   <p:cSld>
     <p:spTree>
@@ -3755,7 +4057,7 @@
             </a:pPr>
             <a:r>
               <a:rPr/>
-              <a:t>Motivation</a:t>
+              <a:t>Recent</a:t>
             </a:r>
             <a:r>
               <a:rPr/>
@@ -3763,23 +4065,7 @@
             </a:r>
             <a:r>
               <a:rPr/>
-              <a:t>for</a:t>
-            </a:r>
-            <a:r>
-              <a:rPr/>
-              <a:t> </a:t>
-            </a:r>
-            <a:r>
-              <a:rPr/>
-              <a:t>this</a:t>
-            </a:r>
-            <a:r>
-              <a:rPr/>
-              <a:t> </a:t>
-            </a:r>
-            <a:r>
-              <a:rPr/>
-              <a:t>presentation?</a:t>
+              <a:t>developments</a:t>
             </a:r>
           </a:p>
         </p:txBody>
@@ -3799,41 +4085,100 @@
           <a:bodyPr/>
           <a:lstStyle/>
           <a:p>
-            <a:pPr lvl="0" marL="0" indent="0">
-              <a:buNone/>
-            </a:pPr>
-            <a:r>
-              <a:rPr/>
-              <a:t>The materials in this presentation have been largely adapted from the Rstudio Webinar by Edgar Ruiz entitled: </a:t>
-            </a:r>
-            <a:r>
-              <a:rPr>
-                <a:hlinkClick r:id="rId2"/>
-              </a:rPr>
-              <a:t>Best practices for working with databases</a:t>
-            </a:r>
-            <a:r>
-              <a:rPr/>
-              <a:t>.</a:t>
-            </a:r>
-          </a:p>
-          <a:p>
-            <a:pPr lvl="0" marL="0" indent="0">
-              <a:buNone/>
-            </a:pPr>
-            <a:r>
-              <a:rPr/>
-              <a:t>A great resource for tools and best practices when working with databases in R can be found here: </a:t>
-            </a:r>
-            <a:r>
-              <a:rPr>
-                <a:hlinkClick r:id="rId3"/>
-              </a:rPr>
-              <a:t>db.rstudio.com</a:t>
-            </a:r>
-            <a:r>
-              <a:rPr/>
-              <a:t>.</a:t>
+            <a:pPr lvl="1"/>
+            <a:r>
+              <a:rPr sz="1800">
+                <a:latin typeface="Courier"/>
+              </a:rPr>
+              <a:t>DBI</a:t>
+            </a:r>
+            <a:r>
+              <a:rPr/>
+              <a:t> package is faster than the legacy </a:t>
+            </a:r>
+            <a:r>
+              <a:rPr sz="1800">
+                <a:latin typeface="Courier"/>
+              </a:rPr>
+              <a:t>RODBC</a:t>
+            </a:r>
+            <a:r>
+              <a:rPr/>
+              <a:t> package</a:t>
+            </a:r>
+          </a:p>
+          <a:p>
+            <a:pPr lvl="1"/>
+            <a:r>
+              <a:rPr sz="1800">
+                <a:latin typeface="Courier"/>
+              </a:rPr>
+              <a:t>dplyr</a:t>
+            </a:r>
+            <a:r>
+              <a:rPr/>
+              <a:t> and </a:t>
+            </a:r>
+            <a:r>
+              <a:rPr sz="1800">
+                <a:latin typeface="Courier"/>
+              </a:rPr>
+              <a:t>dbplyr</a:t>
+            </a:r>
+            <a:r>
+              <a:rPr/>
+              <a:t> packages have a generalized SQL backend for talking to databases</a:t>
+            </a:r>
+          </a:p>
+          <a:p>
+            <a:pPr lvl="1"/>
+            <a:r>
+              <a:rPr sz="1800">
+                <a:latin typeface="Courier"/>
+              </a:rPr>
+              <a:t>dbplyr</a:t>
+            </a:r>
+            <a:r>
+              <a:rPr/>
+              <a:t> package translates R code into database-specific variants</a:t>
+            </a:r>
+          </a:p>
+          <a:p>
+            <a:pPr lvl="1"/>
+            <a:r>
+              <a:rPr sz="1800">
+                <a:latin typeface="Courier"/>
+              </a:rPr>
+              <a:t>odbc</a:t>
+            </a:r>
+            <a:r>
+              <a:rPr/>
+              <a:t> package standardizes database connections and is </a:t>
+            </a:r>
+            <a:r>
+              <a:rPr sz="1800">
+                <a:latin typeface="Courier"/>
+              </a:rPr>
+              <a:t>DBI</a:t>
+            </a:r>
+            <a:r>
+              <a:rPr/>
+              <a:t>-compliant</a:t>
+            </a:r>
+          </a:p>
+          <a:p>
+            <a:pPr lvl="1"/>
+            <a:r>
+              <a:rPr/>
+              <a:t>Rstudio IDE (&gt;v1.1) now includes a </a:t>
+            </a:r>
+            <a:r>
+              <a:rPr b="1"/>
+              <a:t>Connections</a:t>
+            </a:r>
+            <a:r>
+              <a:rPr/>
+              <a:t> pane for connecting to, exploring, and viewing data in a variety of databases</a:t>
             </a:r>
           </a:p>
         </p:txBody>
@@ -3843,7 +4188,7 @@
 </p:sld>
 </file>
 
-<file path=ppt/slides/slide7.xml><?xml version="1.0" encoding="utf-8"?>
+<file path=ppt/slides/slide15.xml><?xml version="1.0" encoding="utf-8"?>
 <p:sld xmlns:a="http://schemas.openxmlformats.org/drawingml/2006/main" xmlns:r="http://schemas.openxmlformats.org/officeDocument/2006/relationships" xmlns:p="http://schemas.openxmlformats.org/presentationml/2006/main">
   <p:cSld>
     <p:spTree>
@@ -3880,145 +4225,6 @@
             </a:pPr>
             <a:r>
               <a:rPr/>
-              <a:t>Goals</a:t>
-            </a:r>
-            <a:r>
-              <a:rPr/>
-              <a:t> </a:t>
-            </a:r>
-            <a:r>
-              <a:rPr/>
-              <a:t>of</a:t>
-            </a:r>
-            <a:r>
-              <a:rPr/>
-              <a:t> </a:t>
-            </a:r>
-            <a:r>
-              <a:rPr/>
-              <a:t>this</a:t>
-            </a:r>
-            <a:r>
-              <a:rPr/>
-              <a:t> </a:t>
-            </a:r>
-            <a:r>
-              <a:rPr/>
-              <a:t>talk</a:t>
-            </a:r>
-          </a:p>
-        </p:txBody>
-      </p:sp>
-      <p:sp>
-        <p:nvSpPr>
-          <p:cNvPr id="3" name="Content Placeholder 2"/>
-          <p:cNvSpPr>
-            <a:spLocks noGrp="1"/>
-          </p:cNvSpPr>
-          <p:nvPr>
-            <p:ph idx="1"/>
-          </p:nvPr>
-        </p:nvSpPr>
-        <p:spPr/>
-        <p:txBody>
-          <a:bodyPr/>
-          <a:lstStyle/>
-          <a:p>
-            <a:pPr lvl="1"/>
-            <a:r>
-              <a:rPr/>
-              <a:t>Take advantage of database engines to speed workflow by analyzing data in place (e.g., using SQL Engine)</a:t>
-            </a:r>
-          </a:p>
-          <a:p>
-            <a:pPr lvl="1"/>
-            <a:r>
-              <a:rPr/>
-              <a:t>Taking advantage of </a:t>
-            </a:r>
-            <a:r>
-              <a:rPr sz="1800">
-                <a:latin typeface="Courier"/>
-              </a:rPr>
-              <a:t>tidyverse</a:t>
-            </a:r>
-            <a:r>
-              <a:rPr/>
-              <a:t> tools (e.g., piped code using </a:t>
-            </a:r>
-            <a:r>
-              <a:rPr sz="1800">
-                <a:latin typeface="Courier"/>
-              </a:rPr>
-              <a:t>%&gt;%</a:t>
-            </a:r>
-            <a:r>
-              <a:rPr/>
-              <a:t>) to facilitate data access rather than SQL</a:t>
-            </a:r>
-          </a:p>
-          <a:p>
-            <a:pPr lvl="1"/>
-            <a:r>
-              <a:rPr/>
-              <a:t>Encouraging reproducible research by linking data to analysis</a:t>
-            </a:r>
-          </a:p>
-          <a:p>
-            <a:pPr lvl="1"/>
-            <a:r>
-              <a:rPr b="1"/>
-              <a:t>New:</a:t>
-            </a:r>
-            <a:r>
-              <a:rPr/>
-              <a:t> Connections Pane in Rstudio IDE (&gt;v1.1)</a:t>
-            </a:r>
-          </a:p>
-        </p:txBody>
-      </p:sp>
-    </p:spTree>
-  </p:cSld>
-</p:sld>
-</file>
-
-<file path=ppt/slides/slide8.xml><?xml version="1.0" encoding="utf-8"?>
-<p:sld xmlns:a="http://schemas.openxmlformats.org/drawingml/2006/main" xmlns:r="http://schemas.openxmlformats.org/officeDocument/2006/relationships" xmlns:p="http://schemas.openxmlformats.org/presentationml/2006/main">
-  <p:cSld>
-    <p:spTree>
-      <p:nvGrpSpPr>
-        <p:cNvPr id="1" name=""/>
-        <p:cNvGrpSpPr/>
-        <p:nvPr/>
-      </p:nvGrpSpPr>
-      <p:grpSpPr>
-        <a:xfrm>
-          <a:off x="0" y="0"/>
-          <a:ext cx="0" cy="0"/>
-          <a:chOff x="0" y="0"/>
-          <a:chExt cx="0" cy="0"/>
-        </a:xfrm>
-      </p:grpSpPr>
-      <p:sp>
-        <p:nvSpPr>
-          <p:cNvPr id="2" name="Title 1"/>
-          <p:cNvSpPr>
-            <a:spLocks noGrp="1"/>
-          </p:cNvSpPr>
-          <p:nvPr>
-            <p:ph type="title"/>
-          </p:nvPr>
-        </p:nvSpPr>
-        <p:spPr/>
-        <p:txBody>
-          <a:bodyPr/>
-          <a:lstStyle/>
-          <a:p>
-            <a:pPr lvl="0" marL="0" indent="0">
-              <a:buNone/>
-            </a:pPr>
-            <a:r>
-              <a:rPr/>
               <a:t>Connections</a:t>
             </a:r>
             <a:r>
@@ -4050,7 +4256,7 @@
       </p:sp>
       <p:pic>
         <p:nvPicPr>
-          <p:cNvPr descr="C:/PROJECTS/R-Users/rDatabase/images/connections.png" id="0" name="Picture 1"/>
+          <p:cNvPr descr="../images/connections.png" id="0" name="Picture 1"/>
           <p:cNvPicPr>
             <a:picLocks noGrp="1" noChangeAspect="1"/>
           </p:cNvPicPr>
@@ -4078,6 +4284,1441 @@
           </a:ln>
         </p:spPr>
       </p:pic>
+    </p:spTree>
+  </p:cSld>
+</p:sld>
+</file>
+
+<file path=ppt/slides/slide16.xml><?xml version="1.0" encoding="utf-8"?>
+<p:sld xmlns:a="http://schemas.openxmlformats.org/drawingml/2006/main" xmlns:r="http://schemas.openxmlformats.org/officeDocument/2006/relationships" xmlns:p="http://schemas.openxmlformats.org/presentationml/2006/main">
+  <p:cSld>
+    <p:spTree>
+      <p:nvGrpSpPr>
+        <p:cNvPr id="1" name=""/>
+        <p:cNvGrpSpPr/>
+        <p:nvPr/>
+      </p:nvGrpSpPr>
+      <p:grpSpPr>
+        <a:xfrm>
+          <a:off x="0" y="0"/>
+          <a:ext cx="0" cy="0"/>
+          <a:chOff x="0" y="0"/>
+          <a:chExt cx="0" cy="0"/>
+        </a:xfrm>
+      </p:grpSpPr>
+      <p:sp>
+        <p:nvSpPr>
+          <p:cNvPr id="2" name="Title 1"/>
+          <p:cNvSpPr>
+            <a:spLocks noGrp="1"/>
+          </p:cNvSpPr>
+          <p:nvPr>
+            <p:ph type="title"/>
+          </p:nvPr>
+        </p:nvSpPr>
+        <p:spPr>
+          <a:xfrm>
+            <a:off x="722313" y="4406900"/>
+            <a:ext cx="7772400" cy="1362075"/>
+          </a:xfrm>
+        </p:spPr>
+        <p:txBody>
+          <a:bodyPr/>
+          <a:lstStyle/>
+          <a:p>
+            <a:pPr lvl="0" marL="0" indent="0">
+              <a:buNone/>
+            </a:pPr>
+            <a:r>
+              <a:rPr/>
+              <a:t>Extras</a:t>
+            </a:r>
+          </a:p>
+        </p:txBody>
+      </p:sp>
+    </p:spTree>
+  </p:cSld>
+</p:sld>
+</file>
+
+<file path=ppt/slides/slide17.xml><?xml version="1.0" encoding="utf-8"?>
+<p:sld xmlns:a="http://schemas.openxmlformats.org/drawingml/2006/main" xmlns:r="http://schemas.openxmlformats.org/officeDocument/2006/relationships" xmlns:p="http://schemas.openxmlformats.org/presentationml/2006/main">
+  <p:cSld>
+    <p:spTree>
+      <p:nvGrpSpPr>
+        <p:cNvPr id="1" name=""/>
+        <p:cNvGrpSpPr/>
+        <p:nvPr/>
+      </p:nvGrpSpPr>
+      <p:grpSpPr>
+        <a:xfrm>
+          <a:off x="0" y="0"/>
+          <a:ext cx="0" cy="0"/>
+          <a:chOff x="0" y="0"/>
+          <a:chExt cx="0" cy="0"/>
+        </a:xfrm>
+      </p:grpSpPr>
+      <p:sp>
+        <p:nvSpPr>
+          <p:cNvPr id="2" name="Title 1"/>
+          <p:cNvSpPr>
+            <a:spLocks noGrp="1"/>
+          </p:cNvSpPr>
+          <p:nvPr>
+            <p:ph type="title"/>
+          </p:nvPr>
+        </p:nvSpPr>
+        <p:spPr/>
+        <p:txBody>
+          <a:bodyPr/>
+          <a:lstStyle/>
+          <a:p>
+            <a:pPr lvl="0" marL="0" indent="0">
+              <a:buNone/>
+            </a:pPr>
+            <a:r>
+              <a:rPr/>
+              <a:t>🚧</a:t>
+            </a:r>
+            <a:r>
+              <a:rPr/>
+              <a:t> </a:t>
+            </a:r>
+            <a:r>
+              <a:rPr>
+                <a:hlinkClick r:id="rId2"/>
+              </a:rPr>
+              <a:t>Drivers</a:t>
+            </a:r>
+            <a:r>
+              <a:rPr>
+                <a:hlinkClick r:id="rId3"/>
+              </a:rPr>
+              <a:t> </a:t>
+            </a:r>
+            <a:r>
+              <a:rPr>
+                <a:hlinkClick r:id="rId4"/>
+              </a:rPr>
+              <a:t>on</a:t>
+            </a:r>
+            <a:r>
+              <a:rPr>
+                <a:hlinkClick r:id="rId5"/>
+              </a:rPr>
+              <a:t> </a:t>
+            </a:r>
+            <a:r>
+              <a:rPr>
+                <a:hlinkClick r:id="rId6"/>
+              </a:rPr>
+              <a:t>Mac</a:t>
+            </a:r>
+            <a:r>
+              <a:rPr/>
+              <a:t> </a:t>
+            </a:r>
+            <a:r>
+              <a:rPr/>
+              <a:t>🚧</a:t>
+            </a:r>
+          </a:p>
+        </p:txBody>
+      </p:sp>
+      <p:sp>
+        <p:nvSpPr>
+          <p:cNvPr id="3" name="Content Placeholder 2"/>
+          <p:cNvSpPr>
+            <a:spLocks noGrp="1"/>
+          </p:cNvSpPr>
+          <p:nvPr>
+            <p:ph idx="1"/>
+          </p:nvPr>
+        </p:nvSpPr>
+        <p:spPr/>
+        <p:txBody>
+          <a:bodyPr/>
+          <a:lstStyle/>
+          <a:p>
+            <a:pPr lvl="1"/>
+            <a:r>
+              <a:rPr/>
+              <a:t>Install homebrew</a:t>
+            </a:r>
+          </a:p>
+          <a:p>
+            <a:pPr lvl="1"/>
+            <a:r>
+              <a:rPr/>
+              <a:t>Install UnixODBC (required for all)</a:t>
+            </a:r>
+          </a:p>
+          <a:p>
+            <a:pPr lvl="2"/>
+            <a:r>
+              <a:rPr sz="1800">
+                <a:latin typeface="Courier"/>
+              </a:rPr>
+              <a:t>brew install unixodbc</a:t>
+            </a:r>
+          </a:p>
+          <a:p>
+            <a:pPr lvl="1"/>
+            <a:r>
+              <a:rPr/>
+              <a:t>Install common DB drivers (optional)</a:t>
+            </a:r>
+          </a:p>
+          <a:p>
+            <a:pPr lvl="2"/>
+            <a:r>
+              <a:rPr/>
+              <a:t>SQL Server ODBC Drivers (Free TDS)</a:t>
+            </a:r>
+          </a:p>
+          <a:p>
+            <a:pPr lvl="2"/>
+            <a:r>
+              <a:rPr sz="1800">
+                <a:latin typeface="Courier"/>
+              </a:rPr>
+              <a:t>brew install freetds --with-unixodbc</a:t>
+            </a:r>
+          </a:p>
+          <a:p>
+            <a:pPr lvl="2"/>
+            <a:r>
+              <a:rPr/>
+              <a:t>PostgreSQL ODBC ODBC Drivers</a:t>
+            </a:r>
+          </a:p>
+          <a:p>
+            <a:pPr lvl="2"/>
+            <a:r>
+              <a:rPr sz="1800">
+                <a:latin typeface="Courier"/>
+              </a:rPr>
+              <a:t>brew install psqlodbc</a:t>
+            </a:r>
+          </a:p>
+          <a:p>
+            <a:pPr lvl="2"/>
+            <a:r>
+              <a:rPr/>
+              <a:t>MySQL ODBC Drivers (and database)</a:t>
+            </a:r>
+          </a:p>
+          <a:p>
+            <a:pPr lvl="2"/>
+            <a:r>
+              <a:rPr sz="1800">
+                <a:latin typeface="Courier"/>
+              </a:rPr>
+              <a:t>brew install mysql</a:t>
+            </a:r>
+          </a:p>
+          <a:p>
+            <a:pPr lvl="2"/>
+            <a:r>
+              <a:rPr/>
+              <a:t>SQLite ODBC Drivers </a:t>
+            </a:r>
+            <a:r>
+              <a:rPr sz="1800">
+                <a:latin typeface="Courier"/>
+              </a:rPr>
+              <a:t>brew install sqliteodbc</a:t>
+            </a:r>
+          </a:p>
+        </p:txBody>
+      </p:sp>
+    </p:spTree>
+  </p:cSld>
+</p:sld>
+</file>
+
+<file path=ppt/slides/slide2.xml><?xml version="1.0" encoding="utf-8"?>
+<p:sld xmlns:a="http://schemas.openxmlformats.org/drawingml/2006/main" xmlns:r="http://schemas.openxmlformats.org/officeDocument/2006/relationships" xmlns:p="http://schemas.openxmlformats.org/presentationml/2006/main">
+  <p:cSld>
+    <p:spTree>
+      <p:nvGrpSpPr>
+        <p:cNvPr id="1" name=""/>
+        <p:cNvGrpSpPr/>
+        <p:nvPr/>
+      </p:nvGrpSpPr>
+      <p:grpSpPr>
+        <a:xfrm>
+          <a:off x="0" y="0"/>
+          <a:ext cx="0" cy="0"/>
+          <a:chOff x="0" y="0"/>
+          <a:chExt cx="0" cy="0"/>
+        </a:xfrm>
+      </p:grpSpPr>
+      <p:sp>
+        <p:nvSpPr>
+          <p:cNvPr id="2" name="Title 1"/>
+          <p:cNvSpPr>
+            <a:spLocks noGrp="1"/>
+          </p:cNvSpPr>
+          <p:nvPr>
+            <p:ph type="title"/>
+          </p:nvPr>
+        </p:nvSpPr>
+        <p:spPr/>
+        <p:txBody>
+          <a:bodyPr/>
+          <a:lstStyle/>
+          <a:p>
+            <a:pPr lvl="0" marL="0" indent="0">
+              <a:buNone/>
+            </a:pPr>
+            <a:r>
+              <a:rPr/>
+              <a:t>What</a:t>
+            </a:r>
+            <a:r>
+              <a:rPr/>
+              <a:t> </a:t>
+            </a:r>
+            <a:r>
+              <a:rPr/>
+              <a:t>is</a:t>
+            </a:r>
+            <a:r>
+              <a:rPr/>
+              <a:t> </a:t>
+            </a:r>
+            <a:r>
+              <a:rPr/>
+              <a:t>a</a:t>
+            </a:r>
+            <a:r>
+              <a:rPr/>
+              <a:t> </a:t>
+            </a:r>
+            <a:r>
+              <a:rPr/>
+              <a:t>Relational</a:t>
+            </a:r>
+            <a:r>
+              <a:rPr/>
+              <a:t> </a:t>
+            </a:r>
+            <a:r>
+              <a:rPr/>
+              <a:t>Database?</a:t>
+            </a:r>
+          </a:p>
+        </p:txBody>
+      </p:sp>
+      <p:sp>
+        <p:nvSpPr>
+          <p:cNvPr id="3" name="Content Placeholder 2"/>
+          <p:cNvSpPr>
+            <a:spLocks noGrp="1"/>
+          </p:cNvSpPr>
+          <p:nvPr>
+            <p:ph idx="1"/>
+          </p:nvPr>
+        </p:nvSpPr>
+        <p:spPr/>
+        <p:txBody>
+          <a:bodyPr/>
+          <a:lstStyle/>
+          <a:p>
+            <a:pPr lvl="0" marL="0" indent="0">
+              <a:buNone/>
+            </a:pPr>
+            <a:r>
+              <a:rPr/>
+              <a:t>From Wikipedia: </a:t>
+            </a:r>
+            <a:r>
+              <a:rPr i="1"/>
+              <a:t>A </a:t>
+            </a:r>
+            <a:r>
+              <a:rPr b="1" i="1"/>
+              <a:t>relational database</a:t>
+            </a:r>
+            <a:r>
+              <a:rPr i="1"/>
+              <a:t> is a digital database based on the relational model of data, as proposed by E. F. Codd in 1970. A software system used to maintain relational databases is a relational database management system (RDBMS). Virtually all relational database systems use SQL (Structured Query Language) for querying and maintaining the database.</a:t>
+            </a:r>
+          </a:p>
+        </p:txBody>
+      </p:sp>
+    </p:spTree>
+  </p:cSld>
+</p:sld>
+</file>
+
+<file path=ppt/slides/slide3.xml><?xml version="1.0" encoding="utf-8"?>
+<p:sld xmlns:a="http://schemas.openxmlformats.org/drawingml/2006/main" xmlns:r="http://schemas.openxmlformats.org/officeDocument/2006/relationships" xmlns:p="http://schemas.openxmlformats.org/presentationml/2006/main">
+  <p:cSld>
+    <p:spTree>
+      <p:nvGrpSpPr>
+        <p:cNvPr id="1" name=""/>
+        <p:cNvGrpSpPr/>
+        <p:nvPr/>
+      </p:nvGrpSpPr>
+      <p:grpSpPr>
+        <a:xfrm>
+          <a:off x="0" y="0"/>
+          <a:ext cx="0" cy="0"/>
+          <a:chOff x="0" y="0"/>
+          <a:chExt cx="0" cy="0"/>
+        </a:xfrm>
+      </p:grpSpPr>
+      <p:sp>
+        <p:nvSpPr>
+          <p:cNvPr id="2" name="Title 1"/>
+          <p:cNvSpPr>
+            <a:spLocks noGrp="1"/>
+          </p:cNvSpPr>
+          <p:nvPr>
+            <p:ph type="title"/>
+          </p:nvPr>
+        </p:nvSpPr>
+        <p:spPr/>
+        <p:txBody>
+          <a:bodyPr/>
+          <a:lstStyle/>
+          <a:p>
+            <a:pPr lvl="0" marL="0" indent="0">
+              <a:buNone/>
+            </a:pPr>
+            <a:r>
+              <a:rPr/>
+              <a:t>What</a:t>
+            </a:r>
+            <a:r>
+              <a:rPr/>
+              <a:t> </a:t>
+            </a:r>
+            <a:r>
+              <a:rPr/>
+              <a:t>is</a:t>
+            </a:r>
+            <a:r>
+              <a:rPr/>
+              <a:t> </a:t>
+            </a:r>
+            <a:r>
+              <a:rPr/>
+              <a:t>a</a:t>
+            </a:r>
+            <a:r>
+              <a:rPr/>
+              <a:t> </a:t>
+            </a:r>
+            <a:r>
+              <a:rPr/>
+              <a:t>Relational</a:t>
+            </a:r>
+            <a:r>
+              <a:rPr/>
+              <a:t> </a:t>
+            </a:r>
+            <a:r>
+              <a:rPr/>
+              <a:t>Database?</a:t>
+            </a:r>
+          </a:p>
+        </p:txBody>
+      </p:sp>
+      <p:sp>
+        <p:nvSpPr>
+          <p:cNvPr id="3" name="Content Placeholder 2"/>
+          <p:cNvSpPr>
+            <a:spLocks noGrp="1"/>
+          </p:cNvSpPr>
+          <p:nvPr>
+            <p:ph idx="1"/>
+          </p:nvPr>
+        </p:nvSpPr>
+        <p:spPr/>
+        <p:txBody>
+          <a:bodyPr/>
+          <a:lstStyle/>
+          <a:p>
+            <a:pPr lvl="0" marL="0" indent="0">
+              <a:buNone/>
+            </a:pPr>
+            <a:r>
+              <a:rPr/>
+              <a:t>From Wikipedia: </a:t>
+            </a:r>
+            <a:r>
+              <a:rPr b="1" i="1"/>
+              <a:t>Relational model</a:t>
+            </a:r>
+            <a:r>
+              <a:rPr i="1"/>
+              <a:t> organizes data into one or more tables (or “relations”) of columns and rows, with a unique key identifying each row. Rows are called records; columns are called attributes. Generally, each table/relation represents one “entity type” (such as customer or product). The rows represent instances of that type of entity (such as “Lee” or “chair”) and the columns representing values attributed to that instance (such as address or price).</a:t>
+            </a:r>
+          </a:p>
+        </p:txBody>
+      </p:sp>
+    </p:spTree>
+  </p:cSld>
+</p:sld>
+</file>
+
+<file path=ppt/slides/slide4.xml><?xml version="1.0" encoding="utf-8"?>
+<p:sld xmlns:a="http://schemas.openxmlformats.org/drawingml/2006/main" xmlns:r="http://schemas.openxmlformats.org/officeDocument/2006/relationships" xmlns:p="http://schemas.openxmlformats.org/presentationml/2006/main">
+  <p:cSld>
+    <p:spTree>
+      <p:nvGrpSpPr>
+        <p:cNvPr id="1" name=""/>
+        <p:cNvGrpSpPr/>
+        <p:nvPr/>
+      </p:nvGrpSpPr>
+      <p:grpSpPr>
+        <a:xfrm>
+          <a:off x="0" y="0"/>
+          <a:ext cx="0" cy="0"/>
+          <a:chOff x="0" y="0"/>
+          <a:chExt cx="0" cy="0"/>
+        </a:xfrm>
+      </p:grpSpPr>
+      <p:sp>
+        <p:nvSpPr>
+          <p:cNvPr id="2" name="Title 1"/>
+          <p:cNvSpPr>
+            <a:spLocks noGrp="1"/>
+          </p:cNvSpPr>
+          <p:nvPr>
+            <p:ph type="title"/>
+          </p:nvPr>
+        </p:nvSpPr>
+        <p:spPr/>
+        <p:txBody>
+          <a:bodyPr/>
+          <a:lstStyle/>
+          <a:p>
+            <a:pPr lvl="0" marL="0" indent="0">
+              <a:buNone/>
+            </a:pPr>
+            <a:r>
+              <a:rPr/>
+              <a:t>Relational</a:t>
+            </a:r>
+            <a:r>
+              <a:rPr/>
+              <a:t> </a:t>
+            </a:r>
+            <a:r>
+              <a:rPr/>
+              <a:t>Database</a:t>
+            </a:r>
+            <a:r>
+              <a:rPr/>
+              <a:t> </a:t>
+            </a:r>
+            <a:r>
+              <a:rPr/>
+              <a:t>Management</a:t>
+            </a:r>
+            <a:r>
+              <a:rPr/>
+              <a:t> </a:t>
+            </a:r>
+            <a:r>
+              <a:rPr/>
+              <a:t>Systems</a:t>
+            </a:r>
+            <a:r>
+              <a:rPr/>
+              <a:t> </a:t>
+            </a:r>
+            <a:r>
+              <a:rPr/>
+              <a:t>(RDMS)</a:t>
+            </a:r>
+          </a:p>
+        </p:txBody>
+      </p:sp>
+      <p:sp>
+        <p:nvSpPr>
+          <p:cNvPr id="3" name="Content Placeholder 2"/>
+          <p:cNvSpPr>
+            <a:spLocks noGrp="1"/>
+          </p:cNvSpPr>
+          <p:nvPr>
+            <p:ph idx="1"/>
+          </p:nvPr>
+        </p:nvSpPr>
+        <p:spPr/>
+        <p:txBody>
+          <a:bodyPr/>
+          <a:lstStyle/>
+          <a:p>
+            <a:pPr lvl="1"/>
+            <a:r>
+              <a:rPr b="1"/>
+              <a:t>MS Access</a:t>
+            </a:r>
+          </a:p>
+          <a:p>
+            <a:pPr lvl="1"/>
+            <a:r>
+              <a:rPr b="1"/>
+              <a:t>MS SQL Server</a:t>
+            </a:r>
+          </a:p>
+          <a:p>
+            <a:pPr lvl="1"/>
+            <a:r>
+              <a:rPr b="1"/>
+              <a:t>Oracle</a:t>
+            </a:r>
+          </a:p>
+          <a:p>
+            <a:pPr lvl="1"/>
+            <a:r>
+              <a:rPr/>
+              <a:t>SQLite</a:t>
+            </a:r>
+          </a:p>
+          <a:p>
+            <a:pPr lvl="1"/>
+            <a:r>
+              <a:rPr/>
+              <a:t>MySQL</a:t>
+            </a:r>
+          </a:p>
+          <a:p>
+            <a:pPr lvl="1"/>
+            <a:r>
+              <a:rPr/>
+              <a:t>PostgreSQL</a:t>
+            </a:r>
+          </a:p>
+          <a:p>
+            <a:pPr lvl="0" marL="0" indent="0">
+              <a:buNone/>
+            </a:pPr>
+            <a:r>
+              <a:rPr/>
+              <a:t>Several others available at (</a:t>
+            </a:r>
+            <a:r>
+              <a:rPr>
+                <a:hlinkClick r:id="rId2"/>
+              </a:rPr>
+              <a:t>http://db.rstudio.com/databases/</a:t>
+            </a:r>
+            <a:r>
+              <a:rPr/>
+              <a:t>).</a:t>
+            </a:r>
+          </a:p>
+        </p:txBody>
+      </p:sp>
+    </p:spTree>
+  </p:cSld>
+</p:sld>
+</file>
+
+<file path=ppt/slides/slide5.xml><?xml version="1.0" encoding="utf-8"?>
+<p:sld xmlns:a="http://schemas.openxmlformats.org/drawingml/2006/main" xmlns:r="http://schemas.openxmlformats.org/officeDocument/2006/relationships" xmlns:p="http://schemas.openxmlformats.org/presentationml/2006/main">
+  <p:cSld>
+    <p:spTree>
+      <p:nvGrpSpPr>
+        <p:cNvPr id="1" name=""/>
+        <p:cNvGrpSpPr/>
+        <p:nvPr/>
+      </p:nvGrpSpPr>
+      <p:grpSpPr>
+        <a:xfrm>
+          <a:off x="0" y="0"/>
+          <a:ext cx="0" cy="0"/>
+          <a:chOff x="0" y="0"/>
+          <a:chExt cx="0" cy="0"/>
+        </a:xfrm>
+      </p:grpSpPr>
+      <p:sp>
+        <p:nvSpPr>
+          <p:cNvPr id="2" name="Title 1"/>
+          <p:cNvSpPr>
+            <a:spLocks noGrp="1"/>
+          </p:cNvSpPr>
+          <p:nvPr>
+            <p:ph type="title"/>
+          </p:nvPr>
+        </p:nvSpPr>
+        <p:spPr/>
+        <p:txBody>
+          <a:bodyPr/>
+          <a:lstStyle/>
+          <a:p>
+            <a:pPr lvl="0" marL="0" indent="0">
+              <a:buNone/>
+            </a:pPr>
+            <a:r>
+              <a:rPr/>
+              <a:t>Why</a:t>
+            </a:r>
+            <a:r>
+              <a:rPr/>
+              <a:t> </a:t>
+            </a:r>
+            <a:r>
+              <a:rPr/>
+              <a:t>put</a:t>
+            </a:r>
+            <a:r>
+              <a:rPr/>
+              <a:t> </a:t>
+            </a:r>
+            <a:r>
+              <a:rPr/>
+              <a:t>data</a:t>
+            </a:r>
+            <a:r>
+              <a:rPr/>
+              <a:t> </a:t>
+            </a:r>
+            <a:r>
+              <a:rPr/>
+              <a:t>in</a:t>
+            </a:r>
+            <a:r>
+              <a:rPr/>
+              <a:t> </a:t>
+            </a:r>
+            <a:r>
+              <a:rPr/>
+              <a:t>a</a:t>
+            </a:r>
+            <a:r>
+              <a:rPr/>
+              <a:t> </a:t>
+            </a:r>
+            <a:r>
+              <a:rPr/>
+              <a:t>database?</a:t>
+            </a:r>
+          </a:p>
+        </p:txBody>
+      </p:sp>
+      <p:sp>
+        <p:nvSpPr>
+          <p:cNvPr id="3" name="Content Placeholder 2"/>
+          <p:cNvSpPr>
+            <a:spLocks noGrp="1"/>
+          </p:cNvSpPr>
+          <p:nvPr>
+            <p:ph idx="1"/>
+          </p:nvPr>
+        </p:nvSpPr>
+        <p:spPr/>
+        <p:txBody>
+          <a:bodyPr/>
+          <a:lstStyle/>
+          <a:p>
+            <a:pPr lvl="1"/>
+            <a:r>
+              <a:rPr/>
+              <a:t>Avoid static, flat files with multiple copies/versions</a:t>
+            </a:r>
+          </a:p>
+          <a:p>
+            <a:pPr lvl="1"/>
+            <a:r>
+              <a:rPr/>
+              <a:t>Centralize data storage with access to many users simultaneously</a:t>
+            </a:r>
+          </a:p>
+          <a:p>
+            <a:pPr lvl="1"/>
+            <a:r>
+              <a:rPr/>
+              <a:t>Improve data quality (i.e., referential integrity)</a:t>
+            </a:r>
+          </a:p>
+          <a:p>
+            <a:pPr lvl="1"/>
+            <a:r>
+              <a:rPr/>
+              <a:t>Store large amounts of data</a:t>
+            </a:r>
+          </a:p>
+          <a:p>
+            <a:pPr lvl="0" marL="0" indent="0">
+              <a:buNone/>
+            </a:pPr>
+            <a:r>
+              <a:rPr b="1" i="1"/>
+              <a:t>But how to you access it once it’s in there?!?</a:t>
+            </a:r>
+            <a:r>
+              <a:rPr/>
+              <a:t> 😮</a:t>
+            </a:r>
+          </a:p>
+        </p:txBody>
+      </p:sp>
+    </p:spTree>
+  </p:cSld>
+</p:sld>
+</file>
+
+<file path=ppt/slides/slide6.xml><?xml version="1.0" encoding="utf-8"?>
+<p:sld xmlns:a="http://schemas.openxmlformats.org/drawingml/2006/main" xmlns:r="http://schemas.openxmlformats.org/officeDocument/2006/relationships" xmlns:p="http://schemas.openxmlformats.org/presentationml/2006/main">
+  <p:cSld>
+    <p:spTree>
+      <p:nvGrpSpPr>
+        <p:cNvPr id="1" name=""/>
+        <p:cNvGrpSpPr/>
+        <p:nvPr/>
+      </p:nvGrpSpPr>
+      <p:grpSpPr>
+        <a:xfrm>
+          <a:off x="0" y="0"/>
+          <a:ext cx="0" cy="0"/>
+          <a:chOff x="0" y="0"/>
+          <a:chExt cx="0" cy="0"/>
+        </a:xfrm>
+      </p:grpSpPr>
+      <p:sp>
+        <p:nvSpPr>
+          <p:cNvPr id="2" name="Title 1"/>
+          <p:cNvSpPr>
+            <a:spLocks noGrp="1"/>
+          </p:cNvSpPr>
+          <p:nvPr>
+            <p:ph type="title"/>
+          </p:nvPr>
+        </p:nvSpPr>
+        <p:spPr/>
+        <p:txBody>
+          <a:bodyPr/>
+          <a:lstStyle/>
+          <a:p>
+            <a:pPr lvl="0" marL="0" indent="0">
+              <a:buNone/>
+            </a:pPr>
+            <a:r>
+              <a:rPr/>
+              <a:t>Open</a:t>
+            </a:r>
+            <a:r>
+              <a:rPr/>
+              <a:t> </a:t>
+            </a:r>
+            <a:r>
+              <a:rPr/>
+              <a:t>Database</a:t>
+            </a:r>
+            <a:r>
+              <a:rPr/>
+              <a:t> </a:t>
+            </a:r>
+            <a:r>
+              <a:rPr/>
+              <a:t>Connectivity</a:t>
+            </a:r>
+            <a:r>
+              <a:rPr/>
+              <a:t> </a:t>
+            </a:r>
+            <a:r>
+              <a:rPr/>
+              <a:t>(</a:t>
+            </a:r>
+            <a:r>
+              <a:rPr b="1"/>
+              <a:t>ODBC</a:t>
+            </a:r>
+            <a:r>
+              <a:rPr/>
+              <a:t>)</a:t>
+            </a:r>
+          </a:p>
+        </p:txBody>
+      </p:sp>
+      <p:pic>
+        <p:nvPicPr>
+          <p:cNvPr descr="../images/drivers.PNG" id="0" name="Picture 1"/>
+          <p:cNvPicPr>
+            <a:picLocks noGrp="1" noChangeAspect="1"/>
+          </p:cNvPicPr>
+          <p:nvPr/>
+        </p:nvPicPr>
+        <p:blipFill>
+          <a:blip r:embed="rId2"/>
+          <a:stretch>
+            <a:fillRect/>
+          </a:stretch>
+        </p:blipFill>
+        <p:spPr bwMode="auto">
+          <a:xfrm>
+            <a:off x="1384300" y="1600200"/>
+            <a:ext cx="6375400" cy="4521200"/>
+          </a:xfrm>
+          <a:prstGeom prst="rect">
+            <a:avLst/>
+          </a:prstGeom>
+          <a:noFill/>
+          <a:ln w="9525">
+            <a:noFill/>
+            <a:headEnd/>
+            <a:tailEnd/>
+          </a:ln>
+        </p:spPr>
+      </p:pic>
+    </p:spTree>
+  </p:cSld>
+</p:sld>
+</file>
+
+<file path=ppt/slides/slide7.xml><?xml version="1.0" encoding="utf-8"?>
+<p:sld xmlns:a="http://schemas.openxmlformats.org/drawingml/2006/main" xmlns:r="http://schemas.openxmlformats.org/officeDocument/2006/relationships" xmlns:p="http://schemas.openxmlformats.org/presentationml/2006/main">
+  <p:cSld>
+    <p:spTree>
+      <p:nvGrpSpPr>
+        <p:cNvPr id="1" name=""/>
+        <p:cNvGrpSpPr/>
+        <p:nvPr/>
+      </p:nvGrpSpPr>
+      <p:grpSpPr>
+        <a:xfrm>
+          <a:off x="0" y="0"/>
+          <a:ext cx="0" cy="0"/>
+          <a:chOff x="0" y="0"/>
+          <a:chExt cx="0" cy="0"/>
+        </a:xfrm>
+      </p:grpSpPr>
+      <p:sp>
+        <p:nvSpPr>
+          <p:cNvPr id="2" name="Title 1"/>
+          <p:cNvSpPr>
+            <a:spLocks noGrp="1"/>
+          </p:cNvSpPr>
+          <p:nvPr>
+            <p:ph type="title"/>
+          </p:nvPr>
+        </p:nvSpPr>
+        <p:spPr/>
+        <p:txBody>
+          <a:bodyPr/>
+          <a:lstStyle/>
+          <a:p>
+            <a:pPr lvl="0" marL="0" indent="0">
+              <a:buNone/>
+            </a:pPr>
+            <a:r>
+              <a:rPr/>
+              <a:t>Open</a:t>
+            </a:r>
+            <a:r>
+              <a:rPr/>
+              <a:t> </a:t>
+            </a:r>
+            <a:r>
+              <a:rPr/>
+              <a:t>Database</a:t>
+            </a:r>
+            <a:r>
+              <a:rPr/>
+              <a:t> </a:t>
+            </a:r>
+            <a:r>
+              <a:rPr/>
+              <a:t>Connectivity</a:t>
+            </a:r>
+            <a:r>
+              <a:rPr/>
+              <a:t> </a:t>
+            </a:r>
+            <a:r>
+              <a:rPr/>
+              <a:t>(</a:t>
+            </a:r>
+            <a:r>
+              <a:rPr b="1"/>
+              <a:t>ODBC</a:t>
+            </a:r>
+            <a:r>
+              <a:rPr/>
+              <a:t>)</a:t>
+            </a:r>
+          </a:p>
+        </p:txBody>
+      </p:sp>
+      <p:sp>
+        <p:nvSpPr>
+          <p:cNvPr id="3" name="Content Placeholder 2"/>
+          <p:cNvSpPr>
+            <a:spLocks noGrp="1"/>
+          </p:cNvSpPr>
+          <p:nvPr>
+            <p:ph idx="1"/>
+          </p:nvPr>
+        </p:nvSpPr>
+        <p:spPr/>
+        <p:txBody>
+          <a:bodyPr/>
+          <a:lstStyle/>
+          <a:p>
+            <a:pPr lvl="0" marL="1270000" indent="0">
+              <a:buNone/>
+            </a:pPr>
+            <a:r>
+              <a:rPr sz="1800" b="1">
+                <a:solidFill>
+                  <a:srgbClr val="007020"/>
+                </a:solidFill>
+                <a:latin typeface="Courier"/>
+              </a:rPr>
+              <a:t>library</a:t>
+            </a:r>
+            <a:r>
+              <a:rPr sz="1800">
+                <a:latin typeface="Courier"/>
+              </a:rPr>
+              <a:t>(odbc)</a:t>
+            </a:r>
+            <a:br/>
+            <a:r>
+              <a:rPr sz="1800" i="1">
+                <a:solidFill>
+                  <a:srgbClr val="60A0B0"/>
+                </a:solidFill>
+                <a:latin typeface="Courier"/>
+              </a:rPr>
+              <a:t># Show installed ODBC drivers</a:t>
+            </a:r>
+            <a:br/>
+            <a:r>
+              <a:rPr sz="1800" b="1">
+                <a:solidFill>
+                  <a:srgbClr val="007020"/>
+                </a:solidFill>
+                <a:latin typeface="Courier"/>
+              </a:rPr>
+              <a:t>tibble</a:t>
+            </a:r>
+            <a:r>
+              <a:rPr sz="1800">
+                <a:latin typeface="Courier"/>
+              </a:rPr>
+              <a:t>(</a:t>
+            </a:r>
+            <a:r>
+              <a:rPr sz="1800" b="1">
+                <a:solidFill>
+                  <a:srgbClr val="007020"/>
+                </a:solidFill>
+                <a:latin typeface="Courier"/>
+              </a:rPr>
+              <a:t>sort</a:t>
+            </a:r>
+            <a:r>
+              <a:rPr sz="1800">
+                <a:latin typeface="Courier"/>
+              </a:rPr>
+              <a:t>(</a:t>
+            </a:r>
+            <a:r>
+              <a:rPr sz="1800" b="1">
+                <a:solidFill>
+                  <a:srgbClr val="007020"/>
+                </a:solidFill>
+                <a:latin typeface="Courier"/>
+              </a:rPr>
+              <a:t>unique</a:t>
+            </a:r>
+            <a:r>
+              <a:rPr sz="1800">
+                <a:latin typeface="Courier"/>
+              </a:rPr>
+              <a:t>(</a:t>
+            </a:r>
+            <a:r>
+              <a:rPr sz="1800" b="1">
+                <a:solidFill>
+                  <a:srgbClr val="007020"/>
+                </a:solidFill>
+                <a:latin typeface="Courier"/>
+              </a:rPr>
+              <a:t>odbcListDrivers</a:t>
+            </a:r>
+            <a:r>
+              <a:rPr sz="1800">
+                <a:latin typeface="Courier"/>
+              </a:rPr>
+              <a:t>()[[</a:t>
+            </a:r>
+            <a:r>
+              <a:rPr sz="1800">
+                <a:solidFill>
+                  <a:srgbClr val="40A070"/>
+                </a:solidFill>
+                <a:latin typeface="Courier"/>
+              </a:rPr>
+              <a:t>1</a:t>
+            </a:r>
+            <a:r>
+              <a:rPr sz="1800">
+                <a:latin typeface="Courier"/>
+              </a:rPr>
+              <a:t>]])))</a:t>
+            </a:r>
+          </a:p>
+          <a:p>
+            <a:pPr lvl="0" marL="1270000" indent="0">
+              <a:buNone/>
+            </a:pPr>
+            <a:r>
+              <a:rPr sz="1800">
+                <a:latin typeface="Courier"/>
+              </a:rPr>
+              <a:t>## # A tibble: 5 x 1
+##   `sort(unique(odbcListDrivers()[[1]]))`                
+##   &lt;chr&gt;                                                 
+## 1 Microsoft Access Driver (*.mdb, *.accdb)              
+## 2 Microsoft Access Text Driver (*.txt, *.csv)           
+## 3 Microsoft Excel Driver (*.xls, *.xlsx, *.xlsm, *.xlsb)
+## 4 SQL Server                                            
+## 5 SQL Server Native Client 11.0</a:t>
+            </a:r>
+          </a:p>
+        </p:txBody>
+      </p:sp>
+    </p:spTree>
+  </p:cSld>
+</p:sld>
+</file>
+
+<file path=ppt/slides/slide8.xml><?xml version="1.0" encoding="utf-8"?>
+<p:sld xmlns:a="http://schemas.openxmlformats.org/drawingml/2006/main" xmlns:r="http://schemas.openxmlformats.org/officeDocument/2006/relationships" xmlns:p="http://schemas.openxmlformats.org/presentationml/2006/main">
+  <p:cSld>
+    <p:spTree>
+      <p:nvGrpSpPr>
+        <p:cNvPr id="1" name=""/>
+        <p:cNvGrpSpPr/>
+        <p:nvPr/>
+      </p:nvGrpSpPr>
+      <p:grpSpPr>
+        <a:xfrm>
+          <a:off x="0" y="0"/>
+          <a:ext cx="0" cy="0"/>
+          <a:chOff x="0" y="0"/>
+          <a:chExt cx="0" cy="0"/>
+        </a:xfrm>
+      </p:grpSpPr>
+      <p:sp>
+        <p:nvSpPr>
+          <p:cNvPr id="2" name="Title 1"/>
+          <p:cNvSpPr>
+            <a:spLocks noGrp="1"/>
+          </p:cNvSpPr>
+          <p:nvPr>
+            <p:ph type="title"/>
+          </p:nvPr>
+        </p:nvSpPr>
+        <p:spPr/>
+        <p:txBody>
+          <a:bodyPr/>
+          <a:lstStyle/>
+          <a:p>
+            <a:pPr lvl="0" marL="0" indent="0">
+              <a:buNone/>
+            </a:pPr>
+            <a:r>
+              <a:rPr/>
+              <a:t>Data</a:t>
+            </a:r>
+            <a:r>
+              <a:rPr/>
+              <a:t> </a:t>
+            </a:r>
+            <a:r>
+              <a:rPr/>
+              <a:t>Source</a:t>
+            </a:r>
+            <a:r>
+              <a:rPr/>
+              <a:t> </a:t>
+            </a:r>
+            <a:r>
+              <a:rPr/>
+              <a:t>Name</a:t>
+            </a:r>
+            <a:r>
+              <a:rPr/>
+              <a:t> </a:t>
+            </a:r>
+            <a:r>
+              <a:rPr/>
+              <a:t>(</a:t>
+            </a:r>
+            <a:r>
+              <a:rPr b="1"/>
+              <a:t>DSN</a:t>
+            </a:r>
+            <a:r>
+              <a:rPr/>
+              <a:t>)</a:t>
+            </a:r>
+          </a:p>
+        </p:txBody>
+      </p:sp>
+      <p:pic>
+        <p:nvPicPr>
+          <p:cNvPr descr="../images/dsn.PNG" id="0" name="Picture 1"/>
+          <p:cNvPicPr>
+            <a:picLocks noGrp="1" noChangeAspect="1"/>
+          </p:cNvPicPr>
+          <p:nvPr/>
+        </p:nvPicPr>
+        <p:blipFill>
+          <a:blip r:embed="rId2"/>
+          <a:stretch>
+            <a:fillRect/>
+          </a:stretch>
+        </p:blipFill>
+        <p:spPr bwMode="auto">
+          <a:xfrm>
+            <a:off x="1384300" y="1600200"/>
+            <a:ext cx="6375400" cy="4521200"/>
+          </a:xfrm>
+          <a:prstGeom prst="rect">
+            <a:avLst/>
+          </a:prstGeom>
+          <a:noFill/>
+          <a:ln w="9525">
+            <a:noFill/>
+            <a:headEnd/>
+            <a:tailEnd/>
+          </a:ln>
+        </p:spPr>
+      </p:pic>
+    </p:spTree>
+  </p:cSld>
+</p:sld>
+</file>
+
+<file path=ppt/slides/slide9.xml><?xml version="1.0" encoding="utf-8"?>
+<p:sld xmlns:a="http://schemas.openxmlformats.org/drawingml/2006/main" xmlns:r="http://schemas.openxmlformats.org/officeDocument/2006/relationships" xmlns:p="http://schemas.openxmlformats.org/presentationml/2006/main">
+  <p:cSld>
+    <p:spTree>
+      <p:nvGrpSpPr>
+        <p:cNvPr id="1" name=""/>
+        <p:cNvGrpSpPr/>
+        <p:nvPr/>
+      </p:nvGrpSpPr>
+      <p:grpSpPr>
+        <a:xfrm>
+          <a:off x="0" y="0"/>
+          <a:ext cx="0" cy="0"/>
+          <a:chOff x="0" y="0"/>
+          <a:chExt cx="0" cy="0"/>
+        </a:xfrm>
+      </p:grpSpPr>
+      <p:sp>
+        <p:nvSpPr>
+          <p:cNvPr id="2" name="Title 1"/>
+          <p:cNvSpPr>
+            <a:spLocks noGrp="1"/>
+          </p:cNvSpPr>
+          <p:nvPr>
+            <p:ph type="title"/>
+          </p:nvPr>
+        </p:nvSpPr>
+        <p:spPr/>
+        <p:txBody>
+          <a:bodyPr/>
+          <a:lstStyle/>
+          <a:p>
+            <a:pPr lvl="0" marL="0" indent="0">
+              <a:buNone/>
+            </a:pPr>
+            <a:r>
+              <a:rPr/>
+              <a:t>Data</a:t>
+            </a:r>
+            <a:r>
+              <a:rPr/>
+              <a:t> </a:t>
+            </a:r>
+            <a:r>
+              <a:rPr/>
+              <a:t>Source</a:t>
+            </a:r>
+            <a:r>
+              <a:rPr/>
+              <a:t> </a:t>
+            </a:r>
+            <a:r>
+              <a:rPr/>
+              <a:t>Name</a:t>
+            </a:r>
+            <a:r>
+              <a:rPr/>
+              <a:t> </a:t>
+            </a:r>
+            <a:r>
+              <a:rPr/>
+              <a:t>(</a:t>
+            </a:r>
+            <a:r>
+              <a:rPr b="1"/>
+              <a:t>DSN</a:t>
+            </a:r>
+            <a:r>
+              <a:rPr/>
+              <a:t>)</a:t>
+            </a:r>
+          </a:p>
+        </p:txBody>
+      </p:sp>
+      <p:sp>
+        <p:nvSpPr>
+          <p:cNvPr id="3" name="Content Placeholder 2"/>
+          <p:cNvSpPr>
+            <a:spLocks noGrp="1"/>
+          </p:cNvSpPr>
+          <p:nvPr>
+            <p:ph idx="1"/>
+          </p:nvPr>
+        </p:nvSpPr>
+        <p:spPr/>
+        <p:txBody>
+          <a:bodyPr/>
+          <a:lstStyle/>
+          <a:p>
+            <a:pPr lvl="0" marL="1270000" indent="0">
+              <a:buNone/>
+            </a:pPr>
+            <a:r>
+              <a:rPr sz="1800" b="1">
+                <a:solidFill>
+                  <a:srgbClr val="007020"/>
+                </a:solidFill>
+                <a:latin typeface="Courier"/>
+              </a:rPr>
+              <a:t>library</a:t>
+            </a:r>
+            <a:r>
+              <a:rPr sz="1800">
+                <a:latin typeface="Courier"/>
+              </a:rPr>
+              <a:t>(odbc)</a:t>
+            </a:r>
+            <a:br/>
+            <a:r>
+              <a:rPr sz="1800" i="1">
+                <a:solidFill>
+                  <a:srgbClr val="60A0B0"/>
+                </a:solidFill>
+                <a:latin typeface="Courier"/>
+              </a:rPr>
+              <a:t># Show installed ODBC drivers</a:t>
+            </a:r>
+            <a:br/>
+            <a:r>
+              <a:rPr sz="1800" b="1">
+                <a:solidFill>
+                  <a:srgbClr val="007020"/>
+                </a:solidFill>
+                <a:latin typeface="Courier"/>
+              </a:rPr>
+              <a:t>tibble</a:t>
+            </a:r>
+            <a:r>
+              <a:rPr sz="1800">
+                <a:latin typeface="Courier"/>
+              </a:rPr>
+              <a:t>(</a:t>
+            </a:r>
+            <a:r>
+              <a:rPr sz="1800" b="1">
+                <a:solidFill>
+                  <a:srgbClr val="007020"/>
+                </a:solidFill>
+                <a:latin typeface="Courier"/>
+              </a:rPr>
+              <a:t>sort</a:t>
+            </a:r>
+            <a:r>
+              <a:rPr sz="1800">
+                <a:latin typeface="Courier"/>
+              </a:rPr>
+              <a:t>(</a:t>
+            </a:r>
+            <a:r>
+              <a:rPr sz="1800" b="1">
+                <a:solidFill>
+                  <a:srgbClr val="007020"/>
+                </a:solidFill>
+                <a:latin typeface="Courier"/>
+              </a:rPr>
+              <a:t>unique</a:t>
+            </a:r>
+            <a:r>
+              <a:rPr sz="1800">
+                <a:latin typeface="Courier"/>
+              </a:rPr>
+              <a:t>(</a:t>
+            </a:r>
+            <a:r>
+              <a:rPr sz="1800" b="1">
+                <a:solidFill>
+                  <a:srgbClr val="007020"/>
+                </a:solidFill>
+                <a:latin typeface="Courier"/>
+              </a:rPr>
+              <a:t>odbcListDataSources</a:t>
+            </a:r>
+            <a:r>
+              <a:rPr sz="1800">
+                <a:latin typeface="Courier"/>
+              </a:rPr>
+              <a:t>()[[</a:t>
+            </a:r>
+            <a:r>
+              <a:rPr sz="1800">
+                <a:solidFill>
+                  <a:srgbClr val="40A070"/>
+                </a:solidFill>
+                <a:latin typeface="Courier"/>
+              </a:rPr>
+              <a:t>1</a:t>
+            </a:r>
+            <a:r>
+              <a:rPr sz="1800">
+                <a:latin typeface="Courier"/>
+              </a:rPr>
+              <a:t>]])))</a:t>
+            </a:r>
+          </a:p>
+          <a:p>
+            <a:pPr lvl="0" marL="1270000" indent="0">
+              <a:buNone/>
+            </a:pPr>
+            <a:r>
+              <a:rPr sz="1800">
+                <a:latin typeface="Courier"/>
+              </a:rPr>
+              <a:t>## # A tibble: 8 x 1
+##   `sort(unique(odbcListDataSources()[[1]]))`
+##   &lt;chr&gt;                                     
+## 1 AST                                       
+## 2 CalCOFI                                   
+## 3 CUFES                                     
+## 4 Excel Files                               
+## 5 MS Access Database                        
+## 6 ROV2                                      
+## 7 training                                  
+## 8 TRAWL</a:t>
+            </a:r>
+          </a:p>
+        </p:txBody>
+      </p:sp>
     </p:spTree>
   </p:cSld>
 </p:sld>

</xml_diff>